<commit_message>
Atualização do slide do sprint 4
</commit_message>
<xml_diff>
--- a/Sprints/Sprint_004 da equipe.pptx
+++ b/Sprints/Sprint_004 da equipe.pptx
@@ -8,10 +8,9 @@
     <p:sldId id="256" r:id="rId2"/>
     <p:sldId id="260" r:id="rId3"/>
     <p:sldId id="280" r:id="rId4"/>
-    <p:sldId id="282" r:id="rId5"/>
-    <p:sldId id="283" r:id="rId6"/>
-    <p:sldId id="261" r:id="rId7"/>
-    <p:sldId id="284" r:id="rId8"/>
+    <p:sldId id="283" r:id="rId5"/>
+    <p:sldId id="261" r:id="rId6"/>
+    <p:sldId id="284" r:id="rId7"/>
   </p:sldIdLst>
   <p:sldSz cx="12192000" cy="6858000"/>
   <p:notesSz cx="6858000" cy="9144000"/>
@@ -354,7 +353,7 @@
             <a:fld id="{5586B75A-687E-405C-8A0B-8D00578BA2C3}" type="datetimeFigureOut">
               <a:rPr lang="en-US" dirty="0"/>
               <a:pPr/>
-              <a:t>9/24/2018</a:t>
+              <a:t>10/1/2018</a:t>
             </a:fld>
             <a:endParaRPr lang="en-US" dirty="0"/>
           </a:p>
@@ -521,7 +520,7 @@
             <a:fld id="{5586B75A-687E-405C-8A0B-8D00578BA2C3}" type="datetimeFigureOut">
               <a:rPr lang="en-US" dirty="0"/>
               <a:pPr/>
-              <a:t>9/24/2018</a:t>
+              <a:t>10/1/2018</a:t>
             </a:fld>
             <a:endParaRPr lang="en-US" dirty="0"/>
           </a:p>
@@ -698,7 +697,7 @@
             <a:fld id="{5586B75A-687E-405C-8A0B-8D00578BA2C3}" type="datetimeFigureOut">
               <a:rPr lang="en-US" dirty="0"/>
               <a:pPr/>
-              <a:t>9/24/2018</a:t>
+              <a:t>10/1/2018</a:t>
             </a:fld>
             <a:endParaRPr lang="en-US" dirty="0"/>
           </a:p>
@@ -865,7 +864,7 @@
             <a:fld id="{5586B75A-687E-405C-8A0B-8D00578BA2C3}" type="datetimeFigureOut">
               <a:rPr lang="en-US" dirty="0"/>
               <a:pPr/>
-              <a:t>9/24/2018</a:t>
+              <a:t>10/1/2018</a:t>
             </a:fld>
             <a:endParaRPr lang="en-US" dirty="0"/>
           </a:p>
@@ -1120,7 +1119,7 @@
             <a:fld id="{5586B75A-687E-405C-8A0B-8D00578BA2C3}" type="datetimeFigureOut">
               <a:rPr lang="en-US" dirty="0"/>
               <a:pPr/>
-              <a:t>9/24/2018</a:t>
+              <a:t>10/1/2018</a:t>
             </a:fld>
             <a:endParaRPr lang="en-US" dirty="0"/>
           </a:p>
@@ -1405,7 +1404,7 @@
             <a:fld id="{5586B75A-687E-405C-8A0B-8D00578BA2C3}" type="datetimeFigureOut">
               <a:rPr lang="en-US" dirty="0"/>
               <a:pPr/>
-              <a:t>9/24/2018</a:t>
+              <a:t>10/1/2018</a:t>
             </a:fld>
             <a:endParaRPr lang="en-US" dirty="0"/>
           </a:p>
@@ -1844,7 +1843,7 @@
             <a:fld id="{5586B75A-687E-405C-8A0B-8D00578BA2C3}" type="datetimeFigureOut">
               <a:rPr lang="en-US" dirty="0"/>
               <a:pPr/>
-              <a:t>9/24/2018</a:t>
+              <a:t>10/1/2018</a:t>
             </a:fld>
             <a:endParaRPr lang="en-US" dirty="0"/>
           </a:p>
@@ -1959,7 +1958,7 @@
             <a:fld id="{5586B75A-687E-405C-8A0B-8D00578BA2C3}" type="datetimeFigureOut">
               <a:rPr lang="en-US" dirty="0"/>
               <a:pPr/>
-              <a:t>9/24/2018</a:t>
+              <a:t>10/1/2018</a:t>
             </a:fld>
             <a:endParaRPr lang="en-US" dirty="0"/>
           </a:p>
@@ -2051,7 +2050,7 @@
             <a:fld id="{5586B75A-687E-405C-8A0B-8D00578BA2C3}" type="datetimeFigureOut">
               <a:rPr lang="en-US" dirty="0"/>
               <a:pPr/>
-              <a:t>9/24/2018</a:t>
+              <a:t>10/1/2018</a:t>
             </a:fld>
             <a:endParaRPr lang="en-US" dirty="0"/>
           </a:p>
@@ -2336,7 +2335,7 @@
             <a:fld id="{5586B75A-687E-405C-8A0B-8D00578BA2C3}" type="datetimeFigureOut">
               <a:rPr lang="en-US" dirty="0"/>
               <a:pPr/>
-              <a:t>9/24/2018</a:t>
+              <a:t>10/1/2018</a:t>
             </a:fld>
             <a:endParaRPr lang="en-US" dirty="0"/>
           </a:p>
@@ -2606,7 +2605,7 @@
             <a:fld id="{5586B75A-687E-405C-8A0B-8D00578BA2C3}" type="datetimeFigureOut">
               <a:rPr lang="en-US" dirty="0"/>
               <a:pPr/>
-              <a:t>9/24/2018</a:t>
+              <a:t>10/1/2018</a:t>
             </a:fld>
             <a:endParaRPr lang="en-US" dirty="0"/>
           </a:p>
@@ -2900,7 +2899,7 @@
             <a:fld id="{5586B75A-687E-405C-8A0B-8D00578BA2C3}" type="datetimeFigureOut">
               <a:rPr lang="en-US" dirty="0"/>
               <a:pPr/>
-              <a:t>9/24/2018</a:t>
+              <a:t>10/1/2018</a:t>
             </a:fld>
             <a:endParaRPr lang="en-US" dirty="0"/>
           </a:p>
@@ -3411,7 +3410,7 @@
             </a:br>
             <a:r>
               <a:rPr lang="pt-BR" dirty="0"/>
-              <a:t>24/09/2018</a:t>
+              <a:t>01/10/2018</a:t>
             </a:r>
           </a:p>
         </p:txBody>
@@ -3800,8 +3799,8 @@
           <a:lstStyle/>
           <a:p>
             <a:r>
-              <a:rPr lang="pt-BR"/>
-              <a:t>2ª Estória </a:t>
+              <a:rPr lang="pt-BR" dirty="0"/>
+              <a:t>3ª Estória </a:t>
             </a:r>
           </a:p>
         </p:txBody>
@@ -3829,11 +3828,11 @@
           <a:p>
             <a:r>
               <a:rPr lang="pt-BR" b="1" dirty="0"/>
-              <a:t>2ª Estória</a:t>
+              <a:t>3ª Estória</a:t>
             </a:r>
             <a:r>
               <a:rPr lang="pt-BR" dirty="0"/>
-              <a:t>: Depuração do Software </a:t>
+              <a:t>: Implementação da interface </a:t>
             </a:r>
           </a:p>
           <a:p>
@@ -3843,7 +3842,15 @@
             </a:r>
             <a:r>
               <a:rPr lang="pt-BR" dirty="0"/>
-              <a:t>: Verificando as classes e seus atributos para ter certeza se tudo é necessário ou não. E se os métodos do diagrama de classes serão suficientes para o software.</a:t>
+              <a:t>: Implementação da interface por meio do </a:t>
+            </a:r>
+            <a:r>
+              <a:rPr lang="pt-BR" dirty="0" err="1"/>
+              <a:t>java.swing</a:t>
+            </a:r>
+            <a:r>
+              <a:rPr lang="pt-BR" dirty="0"/>
+              <a:t> no NetBeans. </a:t>
             </a:r>
           </a:p>
           <a:p>
@@ -3861,7 +3868,7 @@
     </p:spTree>
     <p:extLst>
       <p:ext uri="{BB962C8B-B14F-4D97-AF65-F5344CB8AC3E}">
-        <p14:creationId xmlns:p14="http://schemas.microsoft.com/office/powerpoint/2010/main" val="1391589051"/>
+        <p14:creationId xmlns:p14="http://schemas.microsoft.com/office/powerpoint/2010/main" val="1935292475"/>
       </p:ext>
     </p:extLst>
   </p:cSld>
@@ -3890,132 +3897,6 @@
       </p:grpSpPr>
       <p:sp>
         <p:nvSpPr>
-          <p:cNvPr id="2" name="Título 1">
-            <a:extLst>
-              <a:ext uri="{FF2B5EF4-FFF2-40B4-BE49-F238E27FC236}">
-                <a16:creationId xmlns:a16="http://schemas.microsoft.com/office/drawing/2014/main" id="{3955ABDF-B885-EB4D-A036-E088DD1787E3}"/>
-              </a:ext>
-            </a:extLst>
-          </p:cNvPr>
-          <p:cNvSpPr>
-            <a:spLocks noGrp="1"/>
-          </p:cNvSpPr>
-          <p:nvPr>
-            <p:ph type="title"/>
-          </p:nvPr>
-        </p:nvSpPr>
-        <p:spPr/>
-        <p:txBody>
-          <a:bodyPr/>
-          <a:lstStyle/>
-          <a:p>
-            <a:r>
-              <a:rPr lang="pt-BR" dirty="0"/>
-              <a:t>3ª Estória </a:t>
-            </a:r>
-          </a:p>
-        </p:txBody>
-      </p:sp>
-      <p:sp>
-        <p:nvSpPr>
-          <p:cNvPr id="3" name="Espaço Reservado para Conteúdo 2">
-            <a:extLst>
-              <a:ext uri="{FF2B5EF4-FFF2-40B4-BE49-F238E27FC236}">
-                <a16:creationId xmlns:a16="http://schemas.microsoft.com/office/drawing/2014/main" id="{784B08D6-3AD7-4B47-A8C0-6F77058163DA}"/>
-              </a:ext>
-            </a:extLst>
-          </p:cNvPr>
-          <p:cNvSpPr>
-            <a:spLocks noGrp="1"/>
-          </p:cNvSpPr>
-          <p:nvPr>
-            <p:ph idx="1"/>
-          </p:nvPr>
-        </p:nvSpPr>
-        <p:spPr/>
-        <p:txBody>
-          <a:bodyPr/>
-          <a:lstStyle/>
-          <a:p>
-            <a:r>
-              <a:rPr lang="pt-BR" b="1" dirty="0"/>
-              <a:t>3ª Estória</a:t>
-            </a:r>
-            <a:r>
-              <a:rPr lang="pt-BR" dirty="0"/>
-              <a:t>: Implementação da interface </a:t>
-            </a:r>
-          </a:p>
-          <a:p>
-            <a:r>
-              <a:rPr lang="pt-BR" b="1" dirty="0"/>
-              <a:t>Descrição</a:t>
-            </a:r>
-            <a:r>
-              <a:rPr lang="pt-BR" dirty="0"/>
-              <a:t>: Implementação da interface por meio do </a:t>
-            </a:r>
-            <a:r>
-              <a:rPr lang="pt-BR" dirty="0" err="1"/>
-              <a:t>java.swing</a:t>
-            </a:r>
-            <a:r>
-              <a:rPr lang="pt-BR" dirty="0"/>
-              <a:t> no </a:t>
-            </a:r>
-            <a:r>
-              <a:rPr lang="pt-BR" dirty="0" err="1"/>
-              <a:t>netBeans</a:t>
-            </a:r>
-            <a:r>
-              <a:rPr lang="pt-BR" dirty="0"/>
-              <a:t>. </a:t>
-            </a:r>
-          </a:p>
-          <a:p>
-            <a:r>
-              <a:rPr lang="pt-BR" b="1" dirty="0"/>
-              <a:t>Status</a:t>
-            </a:r>
-            <a:r>
-              <a:rPr lang="pt-BR" dirty="0"/>
-              <a:t>: [Em andamento].</a:t>
-            </a:r>
-          </a:p>
-        </p:txBody>
-      </p:sp>
-    </p:spTree>
-    <p:extLst>
-      <p:ext uri="{BB962C8B-B14F-4D97-AF65-F5344CB8AC3E}">
-        <p14:creationId xmlns:p14="http://schemas.microsoft.com/office/powerpoint/2010/main" val="1935292475"/>
-      </p:ext>
-    </p:extLst>
-  </p:cSld>
-  <p:clrMapOvr>
-    <a:masterClrMapping/>
-  </p:clrMapOvr>
-</p:sld>
-</file>
-
-<file path=ppt/slides/slide6.xml><?xml version="1.0" encoding="utf-8"?>
-<p:sld xmlns:a="http://schemas.openxmlformats.org/drawingml/2006/main" xmlns:r="http://schemas.openxmlformats.org/officeDocument/2006/relationships" xmlns:p="http://schemas.openxmlformats.org/presentationml/2006/main">
-  <p:cSld>
-    <p:spTree>
-      <p:nvGrpSpPr>
-        <p:cNvPr id="1" name=""/>
-        <p:cNvGrpSpPr/>
-        <p:nvPr/>
-      </p:nvGrpSpPr>
-      <p:grpSpPr>
-        <a:xfrm>
-          <a:off x="0" y="0"/>
-          <a:ext cx="0" cy="0"/>
-          <a:chOff x="0" y="0"/>
-          <a:chExt cx="0" cy="0"/>
-        </a:xfrm>
-      </p:grpSpPr>
-      <p:sp>
-        <p:nvSpPr>
           <p:cNvPr id="12" name="Título 11"/>
           <p:cNvSpPr>
             <a:spLocks noGrp="1"/>
@@ -4080,7 +3961,7 @@
 </p:sld>
 </file>
 
-<file path=ppt/slides/slide7.xml><?xml version="1.0" encoding="utf-8"?>
+<file path=ppt/slides/slide6.xml><?xml version="1.0" encoding="utf-8"?>
 <p:sld xmlns:a="http://schemas.openxmlformats.org/drawingml/2006/main" xmlns:r="http://schemas.openxmlformats.org/officeDocument/2006/relationships" xmlns:p="http://schemas.openxmlformats.org/presentationml/2006/main">
   <p:cSld>
     <p:spTree>

</xml_diff>

<commit_message>
Atualização 2 do slide do sprint 4
</commit_message>
<xml_diff>
--- a/Sprints/Sprint_004 da equipe.pptx
+++ b/Sprints/Sprint_004 da equipe.pptx
@@ -3800,7 +3800,7 @@
           <a:p>
             <a:r>
               <a:rPr lang="pt-BR" dirty="0"/>
-              <a:t>3ª Estória </a:t>
+              <a:t>2ª Estória </a:t>
             </a:r>
           </a:p>
         </p:txBody>
@@ -3828,7 +3828,7 @@
           <a:p>
             <a:r>
               <a:rPr lang="pt-BR" b="1" dirty="0"/>
-              <a:t>3ª Estória</a:t>
+              <a:t>2ª Estória</a:t>
             </a:r>
             <a:r>
               <a:rPr lang="pt-BR" dirty="0"/>
@@ -3860,7 +3860,7 @@
             </a:r>
             <a:r>
               <a:rPr lang="pt-BR" dirty="0"/>
-              <a:t>: [Em andamento].</a:t>
+              <a:t>: [Concluído].</a:t>
             </a:r>
           </a:p>
         </p:txBody>

</xml_diff>

<commit_message>
Atualização 3 do slide do sprint 4
</commit_message>
<xml_diff>
--- a/Sprints/Sprint_004 da equipe.pptx
+++ b/Sprints/Sprint_004 da equipe.pptx
@@ -10,7 +10,8 @@
     <p:sldId id="280" r:id="rId4"/>
     <p:sldId id="283" r:id="rId5"/>
     <p:sldId id="261" r:id="rId6"/>
-    <p:sldId id="284" r:id="rId7"/>
+    <p:sldId id="285" r:id="rId7"/>
+    <p:sldId id="284" r:id="rId8"/>
   </p:sldIdLst>
   <p:sldSz cx="12192000" cy="6858000"/>
   <p:notesSz cx="6858000" cy="9144000"/>
@@ -4033,6 +4034,116 @@
             </a:r>
             <a:r>
               <a:rPr lang="pt-BR" dirty="0"/>
+              <a:t>: Terminar a codificação das classes.</a:t>
+            </a:r>
+          </a:p>
+          <a:p>
+            <a:r>
+              <a:rPr lang="pt-BR" b="1" dirty="0"/>
+              <a:t>Descrição</a:t>
+            </a:r>
+            <a:r>
+              <a:rPr lang="pt-BR" dirty="0"/>
+              <a:t>: Terminar a implementação/codificação da superclasse principal do projeto.</a:t>
+            </a:r>
+          </a:p>
+          <a:p>
+            <a:r>
+              <a:rPr lang="pt-BR" b="1" dirty="0"/>
+              <a:t>Status</a:t>
+            </a:r>
+            <a:r>
+              <a:rPr lang="pt-BR" dirty="0"/>
+              <a:t>: [Em andamento].</a:t>
+            </a:r>
+          </a:p>
+        </p:txBody>
+      </p:sp>
+    </p:spTree>
+    <p:extLst>
+      <p:ext uri="{BB962C8B-B14F-4D97-AF65-F5344CB8AC3E}">
+        <p14:creationId xmlns:p14="http://schemas.microsoft.com/office/powerpoint/2010/main" val="1880915893"/>
+      </p:ext>
+    </p:extLst>
+  </p:cSld>
+  <p:clrMapOvr>
+    <a:masterClrMapping/>
+  </p:clrMapOvr>
+</p:sld>
+</file>
+
+<file path=ppt/slides/slide7.xml><?xml version="1.0" encoding="utf-8"?>
+<p:sld xmlns:a="http://schemas.openxmlformats.org/drawingml/2006/main" xmlns:r="http://schemas.openxmlformats.org/officeDocument/2006/relationships" xmlns:p="http://schemas.openxmlformats.org/presentationml/2006/main">
+  <p:cSld>
+    <p:spTree>
+      <p:nvGrpSpPr>
+        <p:cNvPr id="1" name=""/>
+        <p:cNvGrpSpPr/>
+        <p:nvPr/>
+      </p:nvGrpSpPr>
+      <p:grpSpPr>
+        <a:xfrm>
+          <a:off x="0" y="0"/>
+          <a:ext cx="0" cy="0"/>
+          <a:chOff x="0" y="0"/>
+          <a:chExt cx="0" cy="0"/>
+        </a:xfrm>
+      </p:grpSpPr>
+      <p:sp>
+        <p:nvSpPr>
+          <p:cNvPr id="2" name="Título 1">
+            <a:extLst>
+              <a:ext uri="{FF2B5EF4-FFF2-40B4-BE49-F238E27FC236}">
+                <a16:creationId xmlns:a16="http://schemas.microsoft.com/office/drawing/2014/main" id="{3955ABDF-B885-EB4D-A036-E088DD1787E3}"/>
+              </a:ext>
+            </a:extLst>
+          </p:cNvPr>
+          <p:cNvSpPr>
+            <a:spLocks noGrp="1"/>
+          </p:cNvSpPr>
+          <p:nvPr>
+            <p:ph type="title"/>
+          </p:nvPr>
+        </p:nvSpPr>
+        <p:spPr/>
+        <p:txBody>
+          <a:bodyPr/>
+          <a:lstStyle/>
+          <a:p>
+            <a:r>
+              <a:rPr lang="pt-BR" dirty="0"/>
+              <a:t>2ª Estória </a:t>
+            </a:r>
+          </a:p>
+        </p:txBody>
+      </p:sp>
+      <p:sp>
+        <p:nvSpPr>
+          <p:cNvPr id="3" name="Espaço Reservado para Conteúdo 2">
+            <a:extLst>
+              <a:ext uri="{FF2B5EF4-FFF2-40B4-BE49-F238E27FC236}">
+                <a16:creationId xmlns:a16="http://schemas.microsoft.com/office/drawing/2014/main" id="{784B08D6-3AD7-4B47-A8C0-6F77058163DA}"/>
+              </a:ext>
+            </a:extLst>
+          </p:cNvPr>
+          <p:cNvSpPr>
+            <a:spLocks noGrp="1"/>
+          </p:cNvSpPr>
+          <p:nvPr>
+            <p:ph idx="1"/>
+          </p:nvPr>
+        </p:nvSpPr>
+        <p:spPr/>
+        <p:txBody>
+          <a:bodyPr/>
+          <a:lstStyle/>
+          <a:p>
+            <a:r>
+              <a:rPr lang="pt-BR" b="1" dirty="0"/>
+              <a:t>2ª Estória</a:t>
+            </a:r>
+            <a:r>
+              <a:rPr lang="pt-BR" dirty="0"/>
               <a:t>: Ligar a interface ao software.</a:t>
             </a:r>
           </a:p>

</xml_diff>